<commit_message>
Actualización a presentación e instrucciones
</commit_message>
<xml_diff>
--- a/docs/MasterClassEnero2024.pptx
+++ b/docs/MasterClassEnero2024.pptx
@@ -207,7 +207,7 @@
           <a:p>
             <a:fld id="{E84DC4B6-0EE7-472F-AFF8-DFBF4914F4B1}" type="datetimeFigureOut">
               <a:rPr lang="es-MX" smtClean="0"/>
-              <a:t>15/01/2024</a:t>
+              <a:t>26/01/2024</a:t>
             </a:fld>
             <a:endParaRPr lang="es-MX"/>
           </a:p>
@@ -606,6 +606,216 @@
           <a:bodyPr/>
           <a:lstStyle/>
           <a:p>
+            <a:pPr lvl="1"/>
+            <a:r>
+              <a:rPr lang="es-MX" sz="1200" dirty="0"/>
+              <a:t>Profesor: (UTM / ITESM / Anáhuac)</a:t>
+            </a:r>
+          </a:p>
+          <a:p>
+            <a:pPr lvl="1"/>
+            <a:r>
+              <a:rPr lang="es-MX" sz="1200" dirty="0"/>
+              <a:t>Materias: Análisis y diseño de algoritmos / Lenguajes y autómatas / Matemáticas discretas / Matemáticas computacionales / Estructuras de datos / Programación (Java, C, C++, Python) / Bases de datos. </a:t>
+            </a:r>
+          </a:p>
+          <a:p>
+            <a:pPr lvl="1"/>
+            <a:r>
+              <a:rPr lang="es-MX" sz="1200" dirty="0"/>
+              <a:t>Diplomados: Desarrollo de aplicaciones móviles (Java, </a:t>
+            </a:r>
+            <a:r>
+              <a:rPr lang="es-MX" sz="1200" dirty="0" err="1"/>
+              <a:t>Objective</a:t>
+            </a:r>
+            <a:r>
+              <a:rPr lang="es-MX" sz="1200" dirty="0"/>
+              <a:t> C, Swift) / Desarrollo de aplicaciones WEB (Java y Python) </a:t>
+            </a:r>
+          </a:p>
+          <a:p>
+            <a:pPr lvl="1"/>
+            <a:endParaRPr lang="es-MX" sz="2000" dirty="0"/>
+          </a:p>
+          <a:p>
+            <a:pPr lvl="1"/>
+            <a:r>
+              <a:rPr lang="es-MX" sz="2000" dirty="0" err="1"/>
+              <a:t>TruEffort</a:t>
+            </a:r>
+            <a:r>
+              <a:rPr lang="es-MX" sz="2000" dirty="0"/>
+              <a:t>: Desarrollo en la nube – “Microservicios”</a:t>
+            </a:r>
+          </a:p>
+          <a:p>
+            <a:pPr lvl="2"/>
+            <a:r>
+              <a:rPr lang="es-MX" dirty="0"/>
+              <a:t>AWS / Java (</a:t>
+            </a:r>
+            <a:r>
+              <a:rPr lang="es-MX" dirty="0" err="1"/>
+              <a:t>spring</a:t>
+            </a:r>
+            <a:r>
+              <a:rPr lang="es-MX" dirty="0"/>
+              <a:t>) / Python (</a:t>
+            </a:r>
+            <a:r>
+              <a:rPr lang="es-MX" dirty="0" err="1"/>
+              <a:t>django</a:t>
+            </a:r>
+            <a:r>
+              <a:rPr lang="es-MX" dirty="0"/>
+              <a:t>) / JS (</a:t>
+            </a:r>
+            <a:r>
+              <a:rPr lang="es-MX" dirty="0" err="1"/>
+              <a:t>React</a:t>
+            </a:r>
+            <a:r>
+              <a:rPr lang="es-MX" dirty="0"/>
+              <a:t>) </a:t>
+            </a:r>
+          </a:p>
+          <a:p>
+            <a:pPr lvl="1"/>
+            <a:r>
+              <a:rPr lang="es-MX" dirty="0"/>
+              <a:t>Banxico: </a:t>
+            </a:r>
+          </a:p>
+          <a:p>
+            <a:pPr lvl="1"/>
+            <a:r>
+              <a:rPr lang="es-MX" sz="1200" dirty="0"/>
+              <a:t>Proyectos de Desarrollo de Software: </a:t>
+            </a:r>
+            <a:r>
+              <a:rPr lang="es-MX" sz="1200" dirty="0" err="1"/>
+              <a:t>Standalone</a:t>
+            </a:r>
+            <a:r>
+              <a:rPr lang="es-MX" sz="1200" dirty="0"/>
+              <a:t>, Web y móviles</a:t>
+            </a:r>
+          </a:p>
+          <a:p>
+            <a:pPr lvl="1"/>
+            <a:r>
+              <a:rPr lang="es-MX" sz="1200" dirty="0"/>
+              <a:t>Manufactura (Lean </a:t>
+            </a:r>
+            <a:r>
+              <a:rPr lang="es-MX" sz="1200" dirty="0" err="1"/>
+              <a:t>Manufacturing</a:t>
+            </a:r>
+            <a:r>
+              <a:rPr lang="es-MX" sz="1200" dirty="0"/>
+              <a:t> – SIX SIGMA) </a:t>
+            </a:r>
+          </a:p>
+          <a:p>
+            <a:pPr lvl="1"/>
+            <a:r>
+              <a:rPr lang="es-MX" sz="1200" dirty="0"/>
+              <a:t>Investigador (Distribución de efectivo)</a:t>
+            </a:r>
+          </a:p>
+          <a:p>
+            <a:pPr lvl="1"/>
+            <a:endParaRPr lang="es-MX" dirty="0"/>
+          </a:p>
+        </p:txBody>
+      </p:sp>
+      <p:sp>
+        <p:nvSpPr>
+          <p:cNvPr id="4" name="Marcador de número de diapositiva 3"/>
+          <p:cNvSpPr>
+            <a:spLocks noGrp="1"/>
+          </p:cNvSpPr>
+          <p:nvPr>
+            <p:ph type="sldNum" sz="quarter" idx="5"/>
+          </p:nvPr>
+        </p:nvSpPr>
+        <p:spPr/>
+        <p:txBody>
+          <a:bodyPr/>
+          <a:lstStyle/>
+          <a:p>
+            <a:fld id="{26637146-D6E3-4250-90A3-31D911502D4D}" type="slidenum">
+              <a:rPr lang="es-MX" smtClean="0"/>
+              <a:t>2</a:t>
+            </a:fld>
+            <a:endParaRPr lang="es-MX"/>
+          </a:p>
+        </p:txBody>
+      </p:sp>
+    </p:spTree>
+    <p:extLst>
+      <p:ext uri="{BB962C8B-B14F-4D97-AF65-F5344CB8AC3E}">
+        <p14:creationId xmlns:p14="http://schemas.microsoft.com/office/powerpoint/2010/main" val="1827072046"/>
+      </p:ext>
+    </p:extLst>
+  </p:cSld>
+  <p:clrMapOvr>
+    <a:masterClrMapping/>
+  </p:clrMapOvr>
+</p:notes>
+</file>
+
+<file path=ppt/notesSlides/notesSlide3.xml><?xml version="1.0" encoding="utf-8"?>
+<p:notes xmlns:a="http://schemas.openxmlformats.org/drawingml/2006/main" xmlns:r="http://schemas.openxmlformats.org/officeDocument/2006/relationships" xmlns:p="http://schemas.openxmlformats.org/presentationml/2006/main">
+  <p:cSld>
+    <p:spTree>
+      <p:nvGrpSpPr>
+        <p:cNvPr id="1" name=""/>
+        <p:cNvGrpSpPr/>
+        <p:nvPr/>
+      </p:nvGrpSpPr>
+      <p:grpSpPr>
+        <a:xfrm>
+          <a:off x="0" y="0"/>
+          <a:ext cx="0" cy="0"/>
+          <a:chOff x="0" y="0"/>
+          <a:chExt cx="0" cy="0"/>
+        </a:xfrm>
+      </p:grpSpPr>
+      <p:sp>
+        <p:nvSpPr>
+          <p:cNvPr id="2" name="Marcador de imagen de diapositiva 1"/>
+          <p:cNvSpPr>
+            <a:spLocks noGrp="1" noRot="1" noChangeAspect="1"/>
+          </p:cNvSpPr>
+          <p:nvPr>
+            <p:ph type="sldImg"/>
+          </p:nvPr>
+        </p:nvSpPr>
+        <p:spPr/>
+      </p:sp>
+      <p:sp>
+        <p:nvSpPr>
+          <p:cNvPr id="3" name="Marcador de notas 2"/>
+          <p:cNvSpPr>
+            <a:spLocks noGrp="1"/>
+          </p:cNvSpPr>
+          <p:nvPr>
+            <p:ph type="body" idx="1"/>
+          </p:nvPr>
+        </p:nvSpPr>
+        <p:spPr/>
+        <p:txBody>
+          <a:bodyPr/>
+          <a:lstStyle/>
+          <a:p>
+            <a:r>
+              <a:rPr lang="es-MX" dirty="0"/>
+              <a:t>COMUNIDAD</a:t>
+            </a:r>
+          </a:p>
+          <a:p>
             <a:endParaRPr lang="es-MX" dirty="0"/>
           </a:p>
         </p:txBody>
@@ -637,6 +847,302 @@
     <p:extLst>
       <p:ext uri="{BB962C8B-B14F-4D97-AF65-F5344CB8AC3E}">
         <p14:creationId xmlns:p14="http://schemas.microsoft.com/office/powerpoint/2010/main" val="1314668823"/>
+      </p:ext>
+    </p:extLst>
+  </p:cSld>
+  <p:clrMapOvr>
+    <a:masterClrMapping/>
+  </p:clrMapOvr>
+</p:notes>
+</file>
+
+<file path=ppt/notesSlides/notesSlide4.xml><?xml version="1.0" encoding="utf-8"?>
+<p:notes xmlns:a="http://schemas.openxmlformats.org/drawingml/2006/main" xmlns:r="http://schemas.openxmlformats.org/officeDocument/2006/relationships" xmlns:p="http://schemas.openxmlformats.org/presentationml/2006/main">
+  <p:cSld>
+    <p:spTree>
+      <p:nvGrpSpPr>
+        <p:cNvPr id="1" name=""/>
+        <p:cNvGrpSpPr/>
+        <p:nvPr/>
+      </p:nvGrpSpPr>
+      <p:grpSpPr>
+        <a:xfrm>
+          <a:off x="0" y="0"/>
+          <a:ext cx="0" cy="0"/>
+          <a:chOff x="0" y="0"/>
+          <a:chExt cx="0" cy="0"/>
+        </a:xfrm>
+      </p:grpSpPr>
+      <p:sp>
+        <p:nvSpPr>
+          <p:cNvPr id="2" name="Marcador de imagen de diapositiva 1"/>
+          <p:cNvSpPr>
+            <a:spLocks noGrp="1" noRot="1" noChangeAspect="1"/>
+          </p:cNvSpPr>
+          <p:nvPr>
+            <p:ph type="sldImg"/>
+          </p:nvPr>
+        </p:nvSpPr>
+        <p:spPr/>
+      </p:sp>
+      <p:sp>
+        <p:nvSpPr>
+          <p:cNvPr id="3" name="Marcador de notas 2"/>
+          <p:cNvSpPr>
+            <a:spLocks noGrp="1"/>
+          </p:cNvSpPr>
+          <p:nvPr>
+            <p:ph type="body" idx="1"/>
+          </p:nvPr>
+        </p:nvSpPr>
+        <p:spPr/>
+        <p:txBody>
+          <a:bodyPr/>
+          <a:lstStyle/>
+          <a:p>
+            <a:r>
+              <a:rPr lang="es-MX" b="0" i="0" dirty="0">
+                <a:solidFill>
+                  <a:srgbClr val="374151"/>
+                </a:solidFill>
+                <a:effectLst/>
+                <a:latin typeface="Söhne"/>
+              </a:rPr>
+              <a:t>Generalmente el desarrollador pierde el tiempo reinventando la rueda con el desarrollo de </a:t>
+            </a:r>
+            <a:r>
+              <a:rPr lang="es-MX" b="0" i="0" dirty="0" err="1">
+                <a:solidFill>
+                  <a:srgbClr val="374151"/>
+                </a:solidFill>
+                <a:effectLst/>
+                <a:latin typeface="Söhne"/>
+              </a:rPr>
+              <a:t>CRUDs</a:t>
+            </a:r>
+            <a:r>
+              <a:rPr lang="es-MX" b="0" i="0" dirty="0">
+                <a:solidFill>
+                  <a:srgbClr val="374151"/>
+                </a:solidFill>
+                <a:effectLst/>
+                <a:latin typeface="Söhne"/>
+              </a:rPr>
+              <a:t> para gestionar catálogos, usuarios y privilegios.</a:t>
+            </a:r>
+            <a:endParaRPr lang="es-MX" dirty="0"/>
+          </a:p>
+        </p:txBody>
+      </p:sp>
+      <p:sp>
+        <p:nvSpPr>
+          <p:cNvPr id="4" name="Marcador de número de diapositiva 3"/>
+          <p:cNvSpPr>
+            <a:spLocks noGrp="1"/>
+          </p:cNvSpPr>
+          <p:nvPr>
+            <p:ph type="sldNum" sz="quarter" idx="5"/>
+          </p:nvPr>
+        </p:nvSpPr>
+        <p:spPr/>
+        <p:txBody>
+          <a:bodyPr/>
+          <a:lstStyle/>
+          <a:p>
+            <a:fld id="{26637146-D6E3-4250-90A3-31D911502D4D}" type="slidenum">
+              <a:rPr lang="es-MX" smtClean="0"/>
+              <a:t>5</a:t>
+            </a:fld>
+            <a:endParaRPr lang="es-MX"/>
+          </a:p>
+        </p:txBody>
+      </p:sp>
+    </p:spTree>
+    <p:extLst>
+      <p:ext uri="{BB962C8B-B14F-4D97-AF65-F5344CB8AC3E}">
+        <p14:creationId xmlns:p14="http://schemas.microsoft.com/office/powerpoint/2010/main" val="1414183243"/>
+      </p:ext>
+    </p:extLst>
+  </p:cSld>
+  <p:clrMapOvr>
+    <a:masterClrMapping/>
+  </p:clrMapOvr>
+</p:notes>
+</file>
+
+<file path=ppt/notesSlides/notesSlide5.xml><?xml version="1.0" encoding="utf-8"?>
+<p:notes xmlns:a="http://schemas.openxmlformats.org/drawingml/2006/main" xmlns:r="http://schemas.openxmlformats.org/officeDocument/2006/relationships" xmlns:p="http://schemas.openxmlformats.org/presentationml/2006/main">
+  <p:cSld>
+    <p:spTree>
+      <p:nvGrpSpPr>
+        <p:cNvPr id="1" name=""/>
+        <p:cNvGrpSpPr/>
+        <p:nvPr/>
+      </p:nvGrpSpPr>
+      <p:grpSpPr>
+        <a:xfrm>
+          <a:off x="0" y="0"/>
+          <a:ext cx="0" cy="0"/>
+          <a:chOff x="0" y="0"/>
+          <a:chExt cx="0" cy="0"/>
+        </a:xfrm>
+      </p:grpSpPr>
+      <p:sp>
+        <p:nvSpPr>
+          <p:cNvPr id="2" name="Marcador de imagen de diapositiva 1"/>
+          <p:cNvSpPr>
+            <a:spLocks noGrp="1" noRot="1" noChangeAspect="1"/>
+          </p:cNvSpPr>
+          <p:nvPr>
+            <p:ph type="sldImg"/>
+          </p:nvPr>
+        </p:nvSpPr>
+        <p:spPr/>
+      </p:sp>
+      <p:sp>
+        <p:nvSpPr>
+          <p:cNvPr id="3" name="Marcador de notas 2"/>
+          <p:cNvSpPr>
+            <a:spLocks noGrp="1"/>
+          </p:cNvSpPr>
+          <p:nvPr>
+            <p:ph type="body" idx="1"/>
+          </p:nvPr>
+        </p:nvSpPr>
+        <p:spPr/>
+        <p:txBody>
+          <a:bodyPr/>
+          <a:lstStyle/>
+          <a:p>
+            <a:r>
+              <a:rPr lang="es-MX" dirty="0"/>
+              <a:t>El </a:t>
+            </a:r>
+            <a:r>
+              <a:rPr lang="es-MX" dirty="0" err="1"/>
+              <a:t>framework</a:t>
+            </a:r>
+            <a:r>
+              <a:rPr lang="es-MX" dirty="0"/>
+              <a:t> Django</a:t>
+            </a:r>
+          </a:p>
+        </p:txBody>
+      </p:sp>
+      <p:sp>
+        <p:nvSpPr>
+          <p:cNvPr id="4" name="Marcador de número de diapositiva 3"/>
+          <p:cNvSpPr>
+            <a:spLocks noGrp="1"/>
+          </p:cNvSpPr>
+          <p:nvPr>
+            <p:ph type="sldNum" sz="quarter" idx="5"/>
+          </p:nvPr>
+        </p:nvSpPr>
+        <p:spPr/>
+        <p:txBody>
+          <a:bodyPr/>
+          <a:lstStyle/>
+          <a:p>
+            <a:fld id="{26637146-D6E3-4250-90A3-31D911502D4D}" type="slidenum">
+              <a:rPr lang="es-MX" smtClean="0"/>
+              <a:t>6</a:t>
+            </a:fld>
+            <a:endParaRPr lang="es-MX"/>
+          </a:p>
+        </p:txBody>
+      </p:sp>
+    </p:spTree>
+    <p:extLst>
+      <p:ext uri="{BB962C8B-B14F-4D97-AF65-F5344CB8AC3E}">
+        <p14:creationId xmlns:p14="http://schemas.microsoft.com/office/powerpoint/2010/main" val="979528945"/>
+      </p:ext>
+    </p:extLst>
+  </p:cSld>
+  <p:clrMapOvr>
+    <a:masterClrMapping/>
+  </p:clrMapOvr>
+</p:notes>
+</file>
+
+<file path=ppt/notesSlides/notesSlide6.xml><?xml version="1.0" encoding="utf-8"?>
+<p:notes xmlns:a="http://schemas.openxmlformats.org/drawingml/2006/main" xmlns:r="http://schemas.openxmlformats.org/officeDocument/2006/relationships" xmlns:p="http://schemas.openxmlformats.org/presentationml/2006/main">
+  <p:cSld>
+    <p:spTree>
+      <p:nvGrpSpPr>
+        <p:cNvPr id="1" name=""/>
+        <p:cNvGrpSpPr/>
+        <p:nvPr/>
+      </p:nvGrpSpPr>
+      <p:grpSpPr>
+        <a:xfrm>
+          <a:off x="0" y="0"/>
+          <a:ext cx="0" cy="0"/>
+          <a:chOff x="0" y="0"/>
+          <a:chExt cx="0" cy="0"/>
+        </a:xfrm>
+      </p:grpSpPr>
+      <p:sp>
+        <p:nvSpPr>
+          <p:cNvPr id="2" name="Marcador de imagen de diapositiva 1"/>
+          <p:cNvSpPr>
+            <a:spLocks noGrp="1" noRot="1" noChangeAspect="1"/>
+          </p:cNvSpPr>
+          <p:nvPr>
+            <p:ph type="sldImg"/>
+          </p:nvPr>
+        </p:nvSpPr>
+        <p:spPr/>
+      </p:sp>
+      <p:sp>
+        <p:nvSpPr>
+          <p:cNvPr id="3" name="Marcador de notas 2"/>
+          <p:cNvSpPr>
+            <a:spLocks noGrp="1"/>
+          </p:cNvSpPr>
+          <p:nvPr>
+            <p:ph type="body" idx="1"/>
+          </p:nvPr>
+        </p:nvSpPr>
+        <p:spPr/>
+        <p:txBody>
+          <a:bodyPr/>
+          <a:lstStyle/>
+          <a:p>
+            <a:r>
+              <a:rPr lang="es-MX" dirty="0"/>
+              <a:t>DEMO</a:t>
+            </a:r>
+          </a:p>
+        </p:txBody>
+      </p:sp>
+      <p:sp>
+        <p:nvSpPr>
+          <p:cNvPr id="4" name="Marcador de número de diapositiva 3"/>
+          <p:cNvSpPr>
+            <a:spLocks noGrp="1"/>
+          </p:cNvSpPr>
+          <p:nvPr>
+            <p:ph type="sldNum" sz="quarter" idx="5"/>
+          </p:nvPr>
+        </p:nvSpPr>
+        <p:spPr/>
+        <p:txBody>
+          <a:bodyPr/>
+          <a:lstStyle/>
+          <a:p>
+            <a:fld id="{26637146-D6E3-4250-90A3-31D911502D4D}" type="slidenum">
+              <a:rPr lang="es-MX" smtClean="0"/>
+              <a:t>10</a:t>
+            </a:fld>
+            <a:endParaRPr lang="es-MX"/>
+          </a:p>
+        </p:txBody>
+      </p:sp>
+    </p:spTree>
+    <p:extLst>
+      <p:ext uri="{BB962C8B-B14F-4D97-AF65-F5344CB8AC3E}">
+        <p14:creationId xmlns:p14="http://schemas.microsoft.com/office/powerpoint/2010/main" val="3181684911"/>
       </p:ext>
     </p:extLst>
   </p:cSld>
@@ -795,7 +1301,7 @@
           <a:p>
             <a:fld id="{750B8D07-1DCE-0B4B-BBEA-4AF68771CBC5}" type="datetimeFigureOut">
               <a:rPr lang="es-ES_tradnl" smtClean="0"/>
-              <a:t>15/01/2024</a:t>
+              <a:t>26/01/2024</a:t>
             </a:fld>
             <a:endParaRPr lang="es-ES_tradnl"/>
           </a:p>
@@ -995,7 +1501,7 @@
           <a:p>
             <a:fld id="{750B8D07-1DCE-0B4B-BBEA-4AF68771CBC5}" type="datetimeFigureOut">
               <a:rPr lang="es-ES_tradnl" smtClean="0"/>
-              <a:t>15/01/2024</a:t>
+              <a:t>26/01/2024</a:t>
             </a:fld>
             <a:endParaRPr lang="es-ES_tradnl"/>
           </a:p>
@@ -1205,7 +1711,7 @@
           <a:p>
             <a:fld id="{750B8D07-1DCE-0B4B-BBEA-4AF68771CBC5}" type="datetimeFigureOut">
               <a:rPr lang="es-ES_tradnl" smtClean="0"/>
-              <a:t>15/01/2024</a:t>
+              <a:t>26/01/2024</a:t>
             </a:fld>
             <a:endParaRPr lang="es-ES_tradnl"/>
           </a:p>
@@ -1405,7 +1911,7 @@
           <a:p>
             <a:fld id="{750B8D07-1DCE-0B4B-BBEA-4AF68771CBC5}" type="datetimeFigureOut">
               <a:rPr lang="es-ES_tradnl" smtClean="0"/>
-              <a:t>15/01/2024</a:t>
+              <a:t>26/01/2024</a:t>
             </a:fld>
             <a:endParaRPr lang="es-ES_tradnl"/>
           </a:p>
@@ -1681,7 +2187,7 @@
           <a:p>
             <a:fld id="{750B8D07-1DCE-0B4B-BBEA-4AF68771CBC5}" type="datetimeFigureOut">
               <a:rPr lang="es-ES_tradnl" smtClean="0"/>
-              <a:t>15/01/2024</a:t>
+              <a:t>26/01/2024</a:t>
             </a:fld>
             <a:endParaRPr lang="es-ES_tradnl"/>
           </a:p>
@@ -1949,7 +2455,7 @@
           <a:p>
             <a:fld id="{750B8D07-1DCE-0B4B-BBEA-4AF68771CBC5}" type="datetimeFigureOut">
               <a:rPr lang="es-ES_tradnl" smtClean="0"/>
-              <a:t>15/01/2024</a:t>
+              <a:t>26/01/2024</a:t>
             </a:fld>
             <a:endParaRPr lang="es-ES_tradnl"/>
           </a:p>
@@ -2364,7 +2870,7 @@
           <a:p>
             <a:fld id="{750B8D07-1DCE-0B4B-BBEA-4AF68771CBC5}" type="datetimeFigureOut">
               <a:rPr lang="es-ES_tradnl" smtClean="0"/>
-              <a:t>15/01/2024</a:t>
+              <a:t>26/01/2024</a:t>
             </a:fld>
             <a:endParaRPr lang="es-ES_tradnl"/>
           </a:p>
@@ -2506,7 +3012,7 @@
           <a:p>
             <a:fld id="{750B8D07-1DCE-0B4B-BBEA-4AF68771CBC5}" type="datetimeFigureOut">
               <a:rPr lang="es-ES_tradnl" smtClean="0"/>
-              <a:t>15/01/2024</a:t>
+              <a:t>26/01/2024</a:t>
             </a:fld>
             <a:endParaRPr lang="es-ES_tradnl"/>
           </a:p>
@@ -2619,7 +3125,7 @@
           <a:p>
             <a:fld id="{750B8D07-1DCE-0B4B-BBEA-4AF68771CBC5}" type="datetimeFigureOut">
               <a:rPr lang="es-ES_tradnl" smtClean="0"/>
-              <a:t>15/01/2024</a:t>
+              <a:t>26/01/2024</a:t>
             </a:fld>
             <a:endParaRPr lang="es-ES_tradnl"/>
           </a:p>
@@ -2932,7 +3438,7 @@
           <a:p>
             <a:fld id="{750B8D07-1DCE-0B4B-BBEA-4AF68771CBC5}" type="datetimeFigureOut">
               <a:rPr lang="es-ES_tradnl" smtClean="0"/>
-              <a:t>15/01/2024</a:t>
+              <a:t>26/01/2024</a:t>
             </a:fld>
             <a:endParaRPr lang="es-ES_tradnl"/>
           </a:p>
@@ -3221,7 +3727,7 @@
           <a:p>
             <a:fld id="{750B8D07-1DCE-0B4B-BBEA-4AF68771CBC5}" type="datetimeFigureOut">
               <a:rPr lang="es-ES_tradnl" smtClean="0"/>
-              <a:t>15/01/2024</a:t>
+              <a:t>26/01/2024</a:t>
             </a:fld>
             <a:endParaRPr lang="es-ES_tradnl"/>
           </a:p>
@@ -3464,7 +3970,7 @@
           <a:p>
             <a:fld id="{750B8D07-1DCE-0B4B-BBEA-4AF68771CBC5}" type="datetimeFigureOut">
               <a:rPr lang="es-ES_tradnl" smtClean="0"/>
-              <a:t>15/01/2024</a:t>
+              <a:t>26/01/2024</a:t>
             </a:fld>
             <a:endParaRPr lang="es-ES_tradnl"/>
           </a:p>
@@ -4222,7 +4728,11 @@
           </a:p>
           <a:p>
             <a:r>
-              <a:rPr lang="es-MX" dirty="0"/>
+              <a:rPr lang="es-MX" dirty="0">
+                <a:solidFill>
+                  <a:srgbClr val="00B0F0"/>
+                </a:solidFill>
+              </a:rPr>
               <a:t>https://github.com/franvazgom</a:t>
             </a:r>
           </a:p>
@@ -6145,10 +6655,10 @@
           <p:nvPr/>
         </p:nvPicPr>
         <p:blipFill>
-          <a:blip r:embed="rId2">
+          <a:blip r:embed="rId3">
             <a:extLst>
               <a:ext uri="{837473B0-CC2E-450A-ABE3-18F120FF3D39}">
-                <a1611:picAttrSrcUrl xmlns:a1611="http://schemas.microsoft.com/office/drawing/2016/11/main" r:id="rId3"/>
+                <a1611:picAttrSrcUrl xmlns:a1611="http://schemas.microsoft.com/office/drawing/2016/11/main" r:id="rId4"/>
               </a:ext>
             </a:extLst>
           </a:blip>
@@ -6555,6 +7065,14 @@
 <file path=ppt/slides/slide2.xml><?xml version="1.0" encoding="utf-8"?>
 <p:sld xmlns:a="http://schemas.openxmlformats.org/drawingml/2006/main" xmlns:r="http://schemas.openxmlformats.org/officeDocument/2006/relationships" xmlns:p="http://schemas.openxmlformats.org/presentationml/2006/main">
   <p:cSld>
+    <p:bg>
+      <p:bgPr>
+        <a:solidFill>
+          <a:schemeClr val="bg1"/>
+        </a:solidFill>
+        <a:effectLst/>
+      </p:bgPr>
+    </p:bg>
     <p:spTree>
       <p:nvGrpSpPr>
         <p:cNvPr id="1" name=""/>
@@ -6569,6 +7087,135 @@
           <a:chExt cx="0" cy="0"/>
         </a:xfrm>
       </p:grpSpPr>
+      <p:pic>
+        <p:nvPicPr>
+          <p:cNvPr id="1026" name="Picture 2" descr="Qué es el sistema binario? | Escuela de programación, robótica y  pensamiento computacional | Codelearn.es">
+            <a:extLst>
+              <a:ext uri="{FF2B5EF4-FFF2-40B4-BE49-F238E27FC236}">
+                <a16:creationId xmlns:a16="http://schemas.microsoft.com/office/drawing/2014/main" id="{B324E1DD-41ED-4B5A-B785-E123AB04F04C}"/>
+              </a:ext>
+            </a:extLst>
+          </p:cNvPr>
+          <p:cNvPicPr>
+            <a:picLocks noChangeAspect="1" noChangeArrowheads="1"/>
+          </p:cNvPicPr>
+          <p:nvPr/>
+        </p:nvPicPr>
+        <p:blipFill rotWithShape="1">
+          <a:blip r:embed="rId3">
+            <a:duotone>
+              <a:schemeClr val="bg2">
+                <a:shade val="45000"/>
+                <a:satMod val="135000"/>
+              </a:schemeClr>
+              <a:prstClr val="white"/>
+            </a:duotone>
+            <a:extLst>
+              <a:ext uri="{28A0092B-C50C-407E-A947-70E740481C1C}">
+                <a14:useLocalDpi xmlns:a14="http://schemas.microsoft.com/office/drawing/2010/main" val="0"/>
+              </a:ext>
+            </a:extLst>
+          </a:blip>
+          <a:srcRect t="15154" b="5341"/>
+          <a:stretch/>
+        </p:blipFill>
+        <p:spPr bwMode="auto">
+          <a:xfrm>
+            <a:off x="20" y="10"/>
+            <a:ext cx="12191980" cy="6857990"/>
+          </a:xfrm>
+          <a:prstGeom prst="rect">
+            <a:avLst/>
+          </a:prstGeom>
+          <a:noFill/>
+          <a:extLst>
+            <a:ext uri="{909E8E84-426E-40DD-AFC4-6F175D3DCCD1}">
+              <a14:hiddenFill xmlns:a14="http://schemas.microsoft.com/office/drawing/2010/main">
+                <a:solidFill>
+                  <a:srgbClr val="FFFFFF"/>
+                </a:solidFill>
+              </a14:hiddenFill>
+            </a:ext>
+          </a:extLst>
+        </p:spPr>
+      </p:pic>
+      <p:sp>
+        <p:nvSpPr>
+          <p:cNvPr id="1040" name="Rectangle 1037">
+            <a:extLst>
+              <a:ext uri="{FF2B5EF4-FFF2-40B4-BE49-F238E27FC236}">
+                <a16:creationId xmlns:a16="http://schemas.microsoft.com/office/drawing/2014/main" id="{B50AB553-2A96-4A92-96F2-93548E096954}"/>
+              </a:ext>
+              <a:ext uri="{C183D7F6-B498-43B3-948B-1728B52AA6E4}">
+                <adec:decorative xmlns:adec="http://schemas.microsoft.com/office/drawing/2017/decorative" val="1"/>
+              </a:ext>
+            </a:extLst>
+          </p:cNvPr>
+          <p:cNvSpPr>
+            <a:spLocks noGrp="1" noRot="1" noChangeAspect="1" noMove="1" noResize="1" noEditPoints="1" noAdjustHandles="1" noChangeArrowheads="1" noChangeShapeType="1" noTextEdit="1"/>
+          </p:cNvSpPr>
+          <p:nvPr>
+            <p:extLst>
+              <p:ext uri="{386F3935-93C4-4BCD-93E2-E3B085C9AB24}">
+                <p16:designElem xmlns:p16="http://schemas.microsoft.com/office/powerpoint/2015/main" val="1"/>
+              </p:ext>
+            </p:extLst>
+          </p:nvPr>
+        </p:nvSpPr>
+        <p:spPr>
+          <a:xfrm>
+            <a:off x="0" y="0"/>
+            <a:ext cx="12192000" cy="6858000"/>
+          </a:xfrm>
+          <a:prstGeom prst="rect">
+            <a:avLst/>
+          </a:prstGeom>
+          <a:gradFill>
+            <a:gsLst>
+              <a:gs pos="10000">
+                <a:schemeClr val="bg2">
+                  <a:alpha val="68000"/>
+                </a:schemeClr>
+              </a:gs>
+              <a:gs pos="85000">
+                <a:schemeClr val="bg2">
+                  <a:alpha val="97000"/>
+                </a:schemeClr>
+              </a:gs>
+            </a:gsLst>
+            <a:path path="circle">
+              <a:fillToRect l="50000" t="50000" r="50000" b="50000"/>
+            </a:path>
+          </a:gradFill>
+          <a:ln>
+            <a:noFill/>
+          </a:ln>
+        </p:spPr>
+        <p:style>
+          <a:lnRef idx="2">
+            <a:schemeClr val="accent1">
+              <a:shade val="50000"/>
+            </a:schemeClr>
+          </a:lnRef>
+          <a:fillRef idx="1">
+            <a:schemeClr val="accent1"/>
+          </a:fillRef>
+          <a:effectRef idx="0">
+            <a:schemeClr val="accent1"/>
+          </a:effectRef>
+          <a:fontRef idx="minor">
+            <a:schemeClr val="lt1"/>
+          </a:fontRef>
+        </p:style>
+        <p:txBody>
+          <a:bodyPr rtlCol="0" anchor="ctr"/>
+          <a:lstStyle/>
+          <a:p>
+            <a:pPr algn="ctr"/>
+            <a:endParaRPr lang="en-US"/>
+          </a:p>
+        </p:txBody>
+      </p:sp>
       <p:sp>
         <p:nvSpPr>
           <p:cNvPr id="2" name="Título 1">
@@ -6585,13 +7232,20 @@
             <p:ph type="title"/>
           </p:nvPr>
         </p:nvSpPr>
-        <p:spPr/>
+        <p:spPr>
+          <a:xfrm>
+            <a:off x="838200" y="365125"/>
+            <a:ext cx="10515600" cy="1325563"/>
+          </a:xfrm>
+        </p:spPr>
         <p:txBody>
-          <a:bodyPr/>
+          <a:bodyPr>
+            <a:normAutofit/>
+          </a:bodyPr>
           <a:lstStyle/>
           <a:p>
             <a:r>
-              <a:rPr lang="es-MX" dirty="0"/>
+              <a:rPr lang="es-MX"/>
               <a:t>Acerca de Francisco Vázquez…</a:t>
             </a:r>
           </a:p>
@@ -6615,192 +7269,48 @@
         </p:nvSpPr>
         <p:spPr>
           <a:xfrm>
-            <a:off x="372862" y="1825625"/>
-            <a:ext cx="7510509" cy="4667250"/>
+            <a:off x="838200" y="1825625"/>
+            <a:ext cx="10515600" cy="4351338"/>
           </a:xfrm>
         </p:spPr>
         <p:txBody>
           <a:bodyPr>
-            <a:normAutofit fontScale="77500" lnSpcReduction="20000"/>
+            <a:normAutofit/>
           </a:bodyPr>
           <a:lstStyle/>
           <a:p>
             <a:r>
-              <a:rPr lang="es-MX" dirty="0"/>
-              <a:t>Formación: Ciencias Computacionales – Seguridad y Aplicaciones distribuidas</a:t>
+              <a:rPr lang="es-MX" sz="4000" dirty="0"/>
+              <a:t>Ciencias Computacionales – Seguridad y Aplicaciones distribuidas</a:t>
             </a:r>
           </a:p>
           <a:p>
             <a:r>
-              <a:rPr lang="es-MX" dirty="0"/>
-              <a:t>Profesor de cátedra 2001 – fecha (UTM / ITESM / Anáhuac)</a:t>
-            </a:r>
-          </a:p>
-          <a:p>
-            <a:pPr lvl="1"/>
-            <a:r>
-              <a:rPr lang="es-MX" dirty="0"/>
-              <a:t>Materias: Análisis y diseño de algoritmos / Lenguajes y autómatas / Matemáticas discretas / Matemáticas computacionales / Estructuras de datos / Programación (Java, C, C++, Python) / Bases de datos. </a:t>
-            </a:r>
-          </a:p>
-          <a:p>
-            <a:pPr lvl="1"/>
-            <a:r>
-              <a:rPr lang="es-MX" dirty="0"/>
-              <a:t>Diplomados: Desarrollo de aplicaciones móviles (Java, </a:t>
-            </a:r>
-            <a:r>
-              <a:rPr lang="es-MX" dirty="0" err="1"/>
-              <a:t>Objective</a:t>
-            </a:r>
-            <a:r>
-              <a:rPr lang="es-MX" dirty="0"/>
-              <a:t> C, Swift) / Desarrollo de aplicaciones WEB (Java y Python) </a:t>
+              <a:rPr lang="es-MX" sz="4000" dirty="0"/>
+              <a:t>Profesor de cátedra 2001 – fecha</a:t>
             </a:r>
           </a:p>
           <a:p>
             <a:r>
-              <a:rPr lang="es-MX" dirty="0" err="1"/>
+              <a:rPr lang="es-MX" sz="4000" dirty="0"/>
+              <a:t>Banco de México 2002 – fecha</a:t>
+            </a:r>
+          </a:p>
+          <a:p>
+            <a:r>
+              <a:rPr lang="es-MX" sz="4000" dirty="0" err="1"/>
               <a:t>TruEffort</a:t>
             </a:r>
             <a:r>
-              <a:rPr lang="es-MX" dirty="0"/>
+              <a:rPr lang="es-MX" sz="4000" dirty="0"/>
               <a:t> (Asesor - CTO) 2022 - fecha</a:t>
             </a:r>
           </a:p>
           <a:p>
-            <a:pPr lvl="1"/>
-            <a:r>
-              <a:rPr lang="es-MX" dirty="0"/>
-              <a:t>Desarrollo en la nube – “Microservicios”</a:t>
-            </a:r>
-          </a:p>
-          <a:p>
-            <a:pPr lvl="2"/>
-            <a:r>
-              <a:rPr lang="es-MX" dirty="0"/>
-              <a:t>AWS / Java (</a:t>
-            </a:r>
-            <a:r>
-              <a:rPr lang="es-MX" dirty="0" err="1"/>
-              <a:t>spring</a:t>
-            </a:r>
-            <a:r>
-              <a:rPr lang="es-MX" dirty="0"/>
-              <a:t>) / Python (</a:t>
-            </a:r>
-            <a:r>
-              <a:rPr lang="es-MX" dirty="0" err="1"/>
-              <a:t>django</a:t>
-            </a:r>
-            <a:r>
-              <a:rPr lang="es-MX" dirty="0"/>
-              <a:t>) / JS (</a:t>
-            </a:r>
-            <a:r>
-              <a:rPr lang="es-MX" dirty="0" err="1"/>
-              <a:t>React</a:t>
-            </a:r>
-            <a:r>
-              <a:rPr lang="es-MX" dirty="0"/>
-              <a:t>) </a:t>
-            </a:r>
-          </a:p>
-          <a:p>
-            <a:r>
-              <a:rPr lang="es-MX" dirty="0"/>
-              <a:t>Banco de México 2002 - fecha</a:t>
-            </a:r>
-          </a:p>
-          <a:p>
-            <a:pPr lvl="1"/>
-            <a:r>
-              <a:rPr lang="es-MX" dirty="0"/>
-              <a:t>Proyectos de Desarrollo de Software: </a:t>
-            </a:r>
-            <a:r>
-              <a:rPr lang="es-MX" dirty="0" err="1"/>
-              <a:t>Standalone</a:t>
-            </a:r>
-            <a:r>
-              <a:rPr lang="es-MX" dirty="0"/>
-              <a:t>, Web y móviles</a:t>
-            </a:r>
-          </a:p>
-          <a:p>
-            <a:pPr lvl="1"/>
-            <a:r>
-              <a:rPr lang="es-MX" dirty="0"/>
-              <a:t>Manufactura (Lean </a:t>
-            </a:r>
-            <a:r>
-              <a:rPr lang="es-MX" dirty="0" err="1"/>
-              <a:t>Manufacturing</a:t>
-            </a:r>
-            <a:r>
-              <a:rPr lang="es-MX" dirty="0"/>
-              <a:t> – SIX SIGMA) </a:t>
-            </a:r>
-          </a:p>
-          <a:p>
-            <a:pPr lvl="1"/>
-            <a:r>
-              <a:rPr lang="es-MX" dirty="0"/>
-              <a:t>Investigador (Distribución de efectivo)</a:t>
-            </a:r>
-          </a:p>
-          <a:p>
-            <a:endParaRPr lang="es-MX" dirty="0"/>
+            <a:endParaRPr lang="es-MX" sz="4000" dirty="0"/>
           </a:p>
         </p:txBody>
       </p:sp>
-      <p:pic>
-        <p:nvPicPr>
-          <p:cNvPr id="1026" name="Picture 2" descr="Qué es el sistema binario? | Escuela de programación, robótica y  pensamiento computacional | Codelearn.es">
-            <a:extLst>
-              <a:ext uri="{FF2B5EF4-FFF2-40B4-BE49-F238E27FC236}">
-                <a16:creationId xmlns:a16="http://schemas.microsoft.com/office/drawing/2014/main" id="{B324E1DD-41ED-4B5A-B785-E123AB04F04C}"/>
-              </a:ext>
-            </a:extLst>
-          </p:cNvPr>
-          <p:cNvPicPr>
-            <a:picLocks noChangeAspect="1" noChangeArrowheads="1"/>
-          </p:cNvPicPr>
-          <p:nvPr/>
-        </p:nvPicPr>
-        <p:blipFill>
-          <a:blip r:embed="rId2">
-            <a:extLst>
-              <a:ext uri="{28A0092B-C50C-407E-A947-70E740481C1C}">
-                <a14:useLocalDpi xmlns:a14="http://schemas.microsoft.com/office/drawing/2010/main" val="0"/>
-              </a:ext>
-            </a:extLst>
-          </a:blip>
-          <a:srcRect/>
-          <a:stretch>
-            <a:fillRect/>
-          </a:stretch>
-        </p:blipFill>
-        <p:spPr bwMode="auto">
-          <a:xfrm>
-            <a:off x="5479743" y="1559295"/>
-            <a:ext cx="6096000" cy="4305300"/>
-          </a:xfrm>
-          <a:prstGeom prst="rect">
-            <a:avLst/>
-          </a:prstGeom>
-          <a:noFill/>
-          <a:extLst>
-            <a:ext uri="{909E8E84-426E-40DD-AFC4-6F175D3DCCD1}">
-              <a14:hiddenFill xmlns:a14="http://schemas.microsoft.com/office/drawing/2010/main">
-                <a:solidFill>
-                  <a:srgbClr val="FFFFFF"/>
-                </a:solidFill>
-              </a14:hiddenFill>
-            </a:ext>
-          </a:extLst>
-        </p:spPr>
-      </p:pic>
     </p:spTree>
     <p:extLst>
       <p:ext uri="{BB962C8B-B14F-4D97-AF65-F5344CB8AC3E}">
@@ -8539,7 +9049,7 @@
         <p:spPr>
           <a:xfrm>
             <a:off x="6229215" y="5472995"/>
-            <a:ext cx="5962785" cy="1384995"/>
+            <a:ext cx="5962785" cy="954107"/>
           </a:xfrm>
           <a:prstGeom prst="rect">
             <a:avLst/>
@@ -8560,53 +9070,25 @@
             <a:r>
               <a:rPr lang="en-US" sz="2800" dirty="0">
                 <a:solidFill>
-                  <a:schemeClr val="bg1"/>
+                  <a:srgbClr val="00B0F0"/>
                 </a:solidFill>
-                <a:hlinkClick r:id="rId7">
-                  <a:extLst>
-                    <a:ext uri="{A12FA001-AC4F-418D-AE19-62706E023703}">
-                      <ahyp:hlinkClr xmlns:ahyp="http://schemas.microsoft.com/office/drawing/2018/hyperlinkcolor" val="tx"/>
-                    </a:ext>
-                  </a:extLst>
-                </a:hlinkClick>
               </a:rPr>
               <a:t>https://www.tiobe.com/tiobe-index/</a:t>
             </a:r>
-            <a:endParaRPr lang="en-US" sz="2800" dirty="0">
-              <a:solidFill>
-                <a:schemeClr val="bg1"/>
-              </a:solidFill>
-            </a:endParaRPr>
           </a:p>
           <a:p>
             <a:pPr lvl="1"/>
             <a:r>
               <a:rPr lang="en-US" sz="2800" dirty="0" err="1">
                 <a:solidFill>
-                  <a:schemeClr val="bg1"/>
-                </a:solidFill>
-              </a:rPr>
-              <a:t>ChatGPT</a:t>
-            </a:r>
-            <a:endParaRPr lang="en-US" sz="2800" dirty="0">
-              <a:solidFill>
-                <a:schemeClr val="bg1"/>
-              </a:solidFill>
-            </a:endParaRPr>
-          </a:p>
-          <a:p>
-            <a:pPr lvl="1"/>
-            <a:r>
-              <a:rPr lang="en-US" sz="2800" dirty="0" err="1">
-                <a:solidFill>
-                  <a:schemeClr val="bg1"/>
+                  <a:srgbClr val="00B0F0"/>
                 </a:solidFill>
               </a:rPr>
               <a:t>StackOverflow</a:t>
             </a:r>
             <a:endParaRPr lang="es-MX" sz="2800" dirty="0">
               <a:solidFill>
-                <a:schemeClr val="bg1"/>
+                <a:srgbClr val="00B0F0"/>
               </a:solidFill>
             </a:endParaRPr>
           </a:p>
@@ -8776,10 +9258,10 @@
           <p:nvPr/>
         </p:nvPicPr>
         <p:blipFill rotWithShape="1">
-          <a:blip r:embed="rId2">
+          <a:blip r:embed="rId3">
             <a:extLst>
               <a:ext uri="{837473B0-CC2E-450A-ABE3-18F120FF3D39}">
-                <a1611:picAttrSrcUrl xmlns:a1611="http://schemas.microsoft.com/office/drawing/2016/11/main" r:id="rId3"/>
+                <a1611:picAttrSrcUrl xmlns:a1611="http://schemas.microsoft.com/office/drawing/2016/11/main" r:id="rId4"/>
               </a:ext>
             </a:extLst>
           </a:blip>
@@ -8788,7 +9270,7 @@
         </p:blipFill>
         <p:spPr>
           <a:xfrm>
-            <a:off x="322343" y="1185850"/>
+            <a:off x="105367" y="1255592"/>
             <a:ext cx="3876165" cy="4029099"/>
           </a:xfrm>
           <a:prstGeom prst="rect">
@@ -8814,13 +9296,13 @@
         </p:nvSpPr>
         <p:spPr>
           <a:xfrm>
-            <a:off x="4779523" y="1642289"/>
-            <a:ext cx="7198468" cy="4617720"/>
+            <a:off x="3921072" y="1642289"/>
+            <a:ext cx="8056920" cy="4617720"/>
           </a:xfrm>
         </p:spPr>
         <p:txBody>
           <a:bodyPr anchor="t">
-            <a:normAutofit fontScale="77500" lnSpcReduction="20000"/>
+            <a:normAutofit fontScale="92500" lnSpcReduction="20000"/>
           </a:bodyPr>
           <a:lstStyle/>
           <a:p>
@@ -8833,6 +9315,7 @@
             </a:endParaRPr>
           </a:p>
           <a:p>
+            <a:pPr lvl="1"/>
             <a:r>
               <a:rPr lang="es-MX" b="0" i="0" dirty="0">
                 <a:solidFill>
@@ -8861,27 +9344,7 @@
                 <a:effectLst/>
                 <a:latin typeface="Söhne"/>
               </a:rPr>
-              <a:t>", en lugar de perder tiempo en reinventar la rueda con el desarrollo de </a:t>
-            </a:r>
-            <a:r>
-              <a:rPr lang="es-MX" b="0" i="0" dirty="0" err="1">
-                <a:solidFill>
-                  <a:srgbClr val="374151"/>
-                </a:solidFill>
-                <a:effectLst/>
-                <a:latin typeface="Söhne"/>
-              </a:rPr>
-              <a:t>CRUDs</a:t>
-            </a:r>
-            <a:r>
-              <a:rPr lang="es-MX" b="0" i="0" dirty="0">
-                <a:solidFill>
-                  <a:srgbClr val="374151"/>
-                </a:solidFill>
-                <a:effectLst/>
-                <a:latin typeface="Söhne"/>
-              </a:rPr>
-              <a:t> para gestionar catálogos, usuarios y privilegios. </a:t>
+              <a:t>“. </a:t>
             </a:r>
             <a:r>
               <a:rPr lang="es-MX" b="0" i="1" dirty="0">
@@ -8925,17 +9388,21 @@
           <a:p>
             <a:r>
               <a:rPr lang="es-ES_tradnl" dirty="0"/>
-              <a:t>Aplicaciones complejas</a:t>
+              <a:t>Aplicaciones Web</a:t>
             </a:r>
           </a:p>
           <a:p>
+            <a:pPr lvl="1"/>
             <a:r>
               <a:rPr lang="es-ES_tradnl" dirty="0"/>
-              <a:t>Aplicaciones web </a:t>
+              <a:t>Pequeñas y grandes / simples y complejas. </a:t>
             </a:r>
+          </a:p>
+          <a:p>
+            <a:pPr lvl="1"/>
             <a:r>
               <a:rPr lang="es-ES_tradnl" b="1" dirty="0"/>
-              <a:t>eficientes</a:t>
+              <a:t>Eficientes</a:t>
             </a:r>
             <a:r>
               <a:rPr lang="es-ES_tradnl" dirty="0"/>
@@ -8954,7 +9421,7 @@
           <a:p>
             <a:r>
               <a:rPr lang="es-ES_tradnl" dirty="0"/>
-              <a:t>*Django–</a:t>
+              <a:t>Django–</a:t>
             </a:r>
             <a:r>
               <a:rPr lang="es-ES_tradnl" dirty="0" err="1"/>
@@ -9652,7 +10119,7 @@
           <p:nvPr/>
         </p:nvPicPr>
         <p:blipFill>
-          <a:blip r:embed="rId2"/>
+          <a:blip r:embed="rId3"/>
           <a:stretch>
             <a:fillRect/>
           </a:stretch>

</xml_diff>